<commit_message>
minor changes in pptx
</commit_message>
<xml_diff>
--- a/del-Minichallenge-2/docs/del-mc2-präsi.pptx
+++ b/del-Minichallenge-2/docs/del-mc2-präsi.pptx
@@ -483,7 +483,7 @@
           <a:p>
             <a:fld id="{CDF3A020-454D-4915-821C-D52B0F3E3877}" type="datetimeFigureOut">
               <a:rPr lang="de-CH" smtClean="0"/>
-              <a:t>10.01.2024</a:t>
+              <a:t>15.01.2024</a:t>
             </a:fld>
             <a:endParaRPr lang="de-CH"/>
           </a:p>
@@ -900,7 +900,7 @@
           <a:p>
             <a:fld id="{D3C95AD9-EFB2-4898-9832-B98BAA5C8E04}" type="datetime1">
               <a:rPr lang="de-CH" smtClean="0"/>
-              <a:t>10.01.2024</a:t>
+              <a:t>15.01.2024</a:t>
             </a:fld>
             <a:endParaRPr lang="de-CH"/>
           </a:p>
@@ -1104,7 +1104,7 @@
           <a:p>
             <a:fld id="{9E165265-8165-49F1-91A8-E70E1E292982}" type="datetime1">
               <a:rPr lang="de-CH" smtClean="0"/>
-              <a:t>10.01.2024</a:t>
+              <a:t>15.01.2024</a:t>
             </a:fld>
             <a:endParaRPr lang="de-CH"/>
           </a:p>
@@ -1318,7 +1318,7 @@
           <a:p>
             <a:fld id="{1C4EA4CC-4763-44DB-B353-33E4089DD5FB}" type="datetime1">
               <a:rPr lang="de-CH" smtClean="0"/>
-              <a:t>10.01.2024</a:t>
+              <a:t>15.01.2024</a:t>
             </a:fld>
             <a:endParaRPr lang="de-CH"/>
           </a:p>
@@ -1522,7 +1522,7 @@
           <a:p>
             <a:fld id="{F4073F51-5507-415F-93EC-2541CAD0F109}" type="datetime1">
               <a:rPr lang="de-CH" smtClean="0"/>
-              <a:t>10.01.2024</a:t>
+              <a:t>15.01.2024</a:t>
             </a:fld>
             <a:endParaRPr lang="de-CH"/>
           </a:p>
@@ -1802,7 +1802,7 @@
           <a:p>
             <a:fld id="{88036CCC-CD8E-4B19-9B6B-9E686FDF93D0}" type="datetime1">
               <a:rPr lang="de-CH" smtClean="0"/>
-              <a:t>10.01.2024</a:t>
+              <a:t>15.01.2024</a:t>
             </a:fld>
             <a:endParaRPr lang="de-CH"/>
           </a:p>
@@ -2074,7 +2074,7 @@
           <a:p>
             <a:fld id="{D2D6FB56-3D0D-4525-BB35-DA8023D045FB}" type="datetime1">
               <a:rPr lang="de-CH" smtClean="0"/>
-              <a:t>10.01.2024</a:t>
+              <a:t>15.01.2024</a:t>
             </a:fld>
             <a:endParaRPr lang="de-CH"/>
           </a:p>
@@ -2493,7 +2493,7 @@
           <a:p>
             <a:fld id="{F3845D3F-B03C-4CA9-8F08-57FFBC2B022B}" type="datetime1">
               <a:rPr lang="de-CH" smtClean="0"/>
-              <a:t>10.01.2024</a:t>
+              <a:t>15.01.2024</a:t>
             </a:fld>
             <a:endParaRPr lang="de-CH"/>
           </a:p>
@@ -2639,7 +2639,7 @@
           <a:p>
             <a:fld id="{0E0444B1-AE6C-46B4-9799-B73B5D21A082}" type="datetime1">
               <a:rPr lang="de-CH" smtClean="0"/>
-              <a:t>10.01.2024</a:t>
+              <a:t>15.01.2024</a:t>
             </a:fld>
             <a:endParaRPr lang="de-CH"/>
           </a:p>
@@ -2756,7 +2756,7 @@
           <a:p>
             <a:fld id="{960CD63E-96A7-4836-93D3-368297951D0E}" type="datetime1">
               <a:rPr lang="de-CH" smtClean="0"/>
-              <a:t>10.01.2024</a:t>
+              <a:t>15.01.2024</a:t>
             </a:fld>
             <a:endParaRPr lang="de-CH"/>
           </a:p>
@@ -3073,7 +3073,7 @@
           <a:p>
             <a:fld id="{E9902AF4-F34A-4D18-9D52-C55461C44A60}" type="datetime1">
               <a:rPr lang="de-CH" smtClean="0"/>
-              <a:t>10.01.2024</a:t>
+              <a:t>15.01.2024</a:t>
             </a:fld>
             <a:endParaRPr lang="de-CH"/>
           </a:p>
@@ -3366,7 +3366,7 @@
           <a:p>
             <a:fld id="{ECE1BED3-2F6D-497E-8367-89A5F4786F51}" type="datetime1">
               <a:rPr lang="de-CH" smtClean="0"/>
-              <a:t>10.01.2024</a:t>
+              <a:t>15.01.2024</a:t>
             </a:fld>
             <a:endParaRPr lang="de-CH"/>
           </a:p>
@@ -3613,7 +3613,7 @@
           <a:p>
             <a:fld id="{689A735B-5364-43E8-A8C9-423CF5DD2D6E}" type="datetime1">
               <a:rPr lang="de-CH" smtClean="0"/>
-              <a:t>10.01.2024</a:t>
+              <a:t>15.01.2024</a:t>
             </a:fld>
             <a:endParaRPr lang="de-CH"/>
           </a:p>
@@ -4328,7 +4328,7 @@
           <a:p>
             <a:fld id="{E9039B53-64DB-43D6-B390-336BA2AB1C61}" type="datetime1">
               <a:rPr lang="de-CH" smtClean="0"/>
-              <a:t>10.01.2024</a:t>
+              <a:t>15.01.2024</a:t>
             </a:fld>
             <a:endParaRPr lang="de-CH"/>
           </a:p>
@@ -4467,7 +4467,7 @@
           <a:p>
             <a:fld id="{F4073F51-5507-415F-93EC-2541CAD0F109}" type="datetime1">
               <a:rPr lang="de-CH" smtClean="0"/>
-              <a:t>10.01.2024</a:t>
+              <a:t>15.01.2024</a:t>
             </a:fld>
             <a:endParaRPr lang="de-CH"/>
           </a:p>
@@ -4783,7 +4783,7 @@
           <a:p>
             <a:fld id="{EE4D6A01-B4A1-463C-96FF-57D8E00838CD}" type="datetime1">
               <a:rPr lang="de-CH" smtClean="0"/>
-              <a:t>10.01.2024</a:t>
+              <a:t>15.01.2024</a:t>
             </a:fld>
             <a:endParaRPr lang="de-CH"/>
           </a:p>
@@ -5048,7 +5048,7 @@
           <a:p>
             <a:fld id="{F4073F51-5507-415F-93EC-2541CAD0F109}" type="datetime1">
               <a:rPr lang="de-CH" smtClean="0"/>
-              <a:t>10.01.2024</a:t>
+              <a:t>15.01.2024</a:t>
             </a:fld>
             <a:endParaRPr lang="de-CH"/>
           </a:p>
@@ -5352,7 +5352,7 @@
           <a:p>
             <a:fld id="{EE4D6A01-B4A1-463C-96FF-57D8E00838CD}" type="datetime1">
               <a:rPr lang="de-CH" smtClean="0"/>
-              <a:t>10.01.2024</a:t>
+              <a:t>15.01.2024</a:t>
             </a:fld>
             <a:endParaRPr lang="de-CH"/>
           </a:p>
@@ -5593,7 +5593,7 @@
           <a:p>
             <a:fld id="{EE4D6A01-B4A1-463C-96FF-57D8E00838CD}" type="datetime1">
               <a:rPr lang="de-CH" smtClean="0"/>
-              <a:t>10.01.2024</a:t>
+              <a:t>15.01.2024</a:t>
             </a:fld>
             <a:endParaRPr lang="de-CH"/>
           </a:p>
@@ -5735,12 +5735,6 @@
           </a:p>
           <a:p>
             <a:r>
-              <a:rPr lang="de-CH" dirty="0"/>
-              <a:t>Resnet18</a:t>
-            </a:r>
-          </a:p>
-          <a:p>
-            <a:r>
               <a:rPr lang="de-CH" dirty="0" err="1"/>
               <a:t>Overfitting</a:t>
             </a:r>
@@ -5846,7 +5840,7 @@
           <a:p>
             <a:fld id="{EE4D6A01-B4A1-463C-96FF-57D8E00838CD}" type="datetime1">
               <a:rPr lang="de-CH" smtClean="0"/>
-              <a:t>10.01.2024</a:t>
+              <a:t>15.01.2024</a:t>
             </a:fld>
             <a:endParaRPr lang="de-CH"/>
           </a:p>
@@ -5901,10 +5895,10 @@
       </p:pic>
       <p:pic>
         <p:nvPicPr>
-          <p:cNvPr id="8" name="Grafik 7">
-            <a:extLst>
-              <a:ext uri="{FF2B5EF4-FFF2-40B4-BE49-F238E27FC236}">
-                <a16:creationId xmlns:a16="http://schemas.microsoft.com/office/drawing/2014/main" id="{51C22E99-CC2E-57F6-890F-091CDCCDBC35}"/>
+          <p:cNvPr id="11" name="Grafik 10">
+            <a:extLst>
+              <a:ext uri="{FF2B5EF4-FFF2-40B4-BE49-F238E27FC236}">
+                <a16:creationId xmlns:a16="http://schemas.microsoft.com/office/drawing/2014/main" id="{C16B60EC-90DE-06A9-F1FD-813328C532EB}"/>
               </a:ext>
             </a:extLst>
           </p:cNvPr>
@@ -5921,8 +5915,38 @@
         </p:blipFill>
         <p:spPr>
           <a:xfrm>
-            <a:off x="4727530" y="2129424"/>
-            <a:ext cx="3883070" cy="3106455"/>
+            <a:off x="4388463" y="2294338"/>
+            <a:ext cx="3962086" cy="2433149"/>
+          </a:xfrm>
+          <a:prstGeom prst="rect">
+            <a:avLst/>
+          </a:prstGeom>
+        </p:spPr>
+      </p:pic>
+      <p:pic>
+        <p:nvPicPr>
+          <p:cNvPr id="13" name="Grafik 12">
+            <a:extLst>
+              <a:ext uri="{FF2B5EF4-FFF2-40B4-BE49-F238E27FC236}">
+                <a16:creationId xmlns:a16="http://schemas.microsoft.com/office/drawing/2014/main" id="{06AE97DA-2CB5-34BF-077B-2B49F653C00B}"/>
+              </a:ext>
+            </a:extLst>
+          </p:cNvPr>
+          <p:cNvPicPr>
+            <a:picLocks noChangeAspect="1"/>
+          </p:cNvPicPr>
+          <p:nvPr/>
+        </p:nvPicPr>
+        <p:blipFill>
+          <a:blip r:embed="rId4"/>
+          <a:stretch>
+            <a:fillRect/>
+          </a:stretch>
+        </p:blipFill>
+        <p:spPr>
+          <a:xfrm>
+            <a:off x="8356933" y="2294338"/>
+            <a:ext cx="3835067" cy="2356968"/>
           </a:xfrm>
           <a:prstGeom prst="rect">
             <a:avLst/>
@@ -6068,7 +6092,7 @@
           <a:p>
             <a:fld id="{EE4D6A01-B4A1-463C-96FF-57D8E00838CD}" type="datetime1">
               <a:rPr lang="de-CH" smtClean="0"/>
-              <a:t>10.01.2024</a:t>
+              <a:t>15.01.2024</a:t>
             </a:fld>
             <a:endParaRPr lang="de-CH"/>
           </a:p>
@@ -6331,7 +6355,7 @@
           <a:p>
             <a:fld id="{F4073F51-5507-415F-93EC-2541CAD0F109}" type="datetime1">
               <a:rPr lang="de-CH" smtClean="0"/>
-              <a:t>10.01.2024</a:t>
+              <a:t>15.01.2024</a:t>
             </a:fld>
             <a:endParaRPr lang="de-CH"/>
           </a:p>
@@ -6636,7 +6660,7 @@
           <a:p>
             <a:fld id="{F4073F51-5507-415F-93EC-2541CAD0F109}" type="datetime1">
               <a:rPr lang="de-CH" smtClean="0"/>
-              <a:t>10.01.2024</a:t>
+              <a:t>15.01.2024</a:t>
             </a:fld>
             <a:endParaRPr lang="de-CH"/>
           </a:p>

</xml_diff>